<commit_message>
UML ER x Class Diagram Modified
</commit_message>
<xml_diff>
--- a/Work Space/Presentation/Eagle7 Presentation.pptx
+++ b/Work Space/Presentation/Eagle7 Presentation.pptx
@@ -121,6 +121,11 @@
       </a:defRPr>
     </a:lvl9pPr>
   </p:defaultTextStyle>
+  <p:extLst>
+    <p:ext uri="{EFAFB233-063F-42B5-8137-9DF3F51BA10A}">
+      <p15:sldGuideLst xmlns:p15="http://schemas.microsoft.com/office/powerpoint/2012/main"/>
+    </p:ext>
+  </p:extLst>
 </p:presentation>
 </file>
 
@@ -4880,7 +4885,6 @@
               <a:rPr lang="fr-FR" dirty="0"/>
               <a:t>commerciales et apporte une valeur élevée aux clients et aux employés.</a:t>
             </a:r>
-            <a:endParaRPr lang="fr-FR" dirty="0"/>
           </a:p>
         </p:txBody>
       </p:sp>
@@ -5080,7 +5084,6 @@
               <a:rPr lang="fr-FR" dirty="0"/>
               <a:t>et matériel, en entrée comme en sortie, des stocks et du transport des produits. </a:t>
             </a:r>
-            <a:endParaRPr lang="fr-FR" dirty="0"/>
           </a:p>
         </p:txBody>
       </p:sp>
@@ -5335,7 +5338,6 @@
               <a:rPr lang="fr-FR" dirty="0"/>
               <a:t>dédiés à la gestion d’une entreprise. </a:t>
             </a:r>
-            <a:endParaRPr lang="fr-FR" dirty="0"/>
           </a:p>
         </p:txBody>
       </p:sp>

</xml_diff>